<commit_message>
Corrected a minor typo in a talk that was given at the 2011 CellML Workshop.
</commit_message>
<xml_diff>
--- a/doc/res/dissemination/2011-04-12-CellmlWorkshop2011-Auckland-NewZealand.pptx
+++ b/doc/res/dissemination/2011-04-12-CellmlWorkshop2011-Auckland-NewZealand.pptx
@@ -10438,17 +10438,32 @@
                 </a:solidFill>
                 <a:latin typeface="Calibri" pitchFamily="34" charset="0"/>
               </a:rPr>
-              <a:t> files (only for text-based views</a:t>
-            </a:r>
-            <a:r>
-              <a:rPr lang="en-GB" sz="2000" dirty="0" smtClean="0">
-                <a:solidFill>
-                  <a:srgbClr val="003052"/>
-                </a:solidFill>
-                <a:latin typeface="Calibri" pitchFamily="34" charset="0"/>
-              </a:rPr>
-              <a:t>); and</a:t>
-            </a:r>
+              <a:t> files (only for text-based </a:t>
+            </a:r>
+            <a:r>
+              <a:rPr lang="en-GB" sz="2000">
+                <a:solidFill>
+                  <a:srgbClr val="003052"/>
+                </a:solidFill>
+                <a:latin typeface="Calibri" pitchFamily="34" charset="0"/>
+              </a:rPr>
+              <a:t>views</a:t>
+            </a:r>
+            <a:r>
+              <a:rPr lang="en-GB" sz="2000" smtClean="0">
+                <a:solidFill>
+                  <a:srgbClr val="003052"/>
+                </a:solidFill>
+                <a:latin typeface="Calibri" pitchFamily="34" charset="0"/>
+              </a:rPr>
+              <a:t>);</a:t>
+            </a:r>
+            <a:endParaRPr lang="en-GB" sz="2000" dirty="0" smtClean="0">
+              <a:solidFill>
+                <a:srgbClr val="003052"/>
+              </a:solidFill>
+              <a:latin typeface="Calibri" pitchFamily="34" charset="0"/>
+            </a:endParaRPr>
           </a:p>
           <a:p>
             <a:pPr marL="820738" lvl="1" indent="-363538" algn="just">

</xml_diff>